<commit_message>
New video, Active Object design pattern adjustments.
</commit_message>
<xml_diff>
--- a/MileStone3.pptx
+++ b/MileStone3.pptx
@@ -8,7 +8,7 @@
     <p:sldId id="256" r:id="rId2"/>
     <p:sldId id="257" r:id="rId3"/>
     <p:sldId id="258" r:id="rId4"/>
-    <p:sldId id="260" r:id="rId5"/>
+    <p:sldId id="261" r:id="rId5"/>
   </p:sldIdLst>
   <p:sldSz cx="12192000" cy="6858000"/>
   <p:notesSz cx="6858000" cy="9144000"/>
@@ -266,7 +266,7 @@
           <a:p>
             <a:fld id="{2F3E8B1C-86EF-43CF-8304-249481088644}" type="datetimeFigureOut">
               <a:rPr lang="en-US" smtClean="0"/>
-              <a:t>6/6/2021</a:t>
+              <a:t>6/7/2021</a:t>
             </a:fld>
             <a:endParaRPr lang="en-US"/>
           </a:p>
@@ -464,7 +464,7 @@
           <a:p>
             <a:fld id="{2F3E8B1C-86EF-43CF-8304-249481088644}" type="datetimeFigureOut">
               <a:rPr lang="en-US" smtClean="0"/>
-              <a:t>6/6/2021</a:t>
+              <a:t>6/7/2021</a:t>
             </a:fld>
             <a:endParaRPr lang="en-US"/>
           </a:p>
@@ -672,7 +672,7 @@
           <a:p>
             <a:fld id="{2F3E8B1C-86EF-43CF-8304-249481088644}" type="datetimeFigureOut">
               <a:rPr lang="en-US" smtClean="0"/>
-              <a:t>6/6/2021</a:t>
+              <a:t>6/7/2021</a:t>
             </a:fld>
             <a:endParaRPr lang="en-US"/>
           </a:p>
@@ -870,7 +870,7 @@
           <a:p>
             <a:fld id="{2F3E8B1C-86EF-43CF-8304-249481088644}" type="datetimeFigureOut">
               <a:rPr lang="en-US" smtClean="0"/>
-              <a:t>6/6/2021</a:t>
+              <a:t>6/7/2021</a:t>
             </a:fld>
             <a:endParaRPr lang="en-US"/>
           </a:p>
@@ -1145,7 +1145,7 @@
           <a:p>
             <a:fld id="{2F3E8B1C-86EF-43CF-8304-249481088644}" type="datetimeFigureOut">
               <a:rPr lang="en-US" smtClean="0"/>
-              <a:t>6/6/2021</a:t>
+              <a:t>6/7/2021</a:t>
             </a:fld>
             <a:endParaRPr lang="en-US"/>
           </a:p>
@@ -1415,7 +1415,7 @@
           <a:p>
             <a:fld id="{2F3E8B1C-86EF-43CF-8304-249481088644}" type="datetimeFigureOut">
               <a:rPr lang="en-US" smtClean="0"/>
-              <a:t>6/6/2021</a:t>
+              <a:t>6/7/2021</a:t>
             </a:fld>
             <a:endParaRPr lang="en-US"/>
           </a:p>
@@ -1835,7 +1835,7 @@
           <a:p>
             <a:fld id="{2F3E8B1C-86EF-43CF-8304-249481088644}" type="datetimeFigureOut">
               <a:rPr lang="en-US" smtClean="0"/>
-              <a:t>6/6/2021</a:t>
+              <a:t>6/7/2021</a:t>
             </a:fld>
             <a:endParaRPr lang="en-US"/>
           </a:p>
@@ -1976,7 +1976,7 @@
           <a:p>
             <a:fld id="{2F3E8B1C-86EF-43CF-8304-249481088644}" type="datetimeFigureOut">
               <a:rPr lang="en-US" smtClean="0"/>
-              <a:t>6/6/2021</a:t>
+              <a:t>6/7/2021</a:t>
             </a:fld>
             <a:endParaRPr lang="en-US"/>
           </a:p>
@@ -2089,7 +2089,7 @@
           <a:p>
             <a:fld id="{2F3E8B1C-86EF-43CF-8304-249481088644}" type="datetimeFigureOut">
               <a:rPr lang="en-US" smtClean="0"/>
-              <a:t>6/6/2021</a:t>
+              <a:t>6/7/2021</a:t>
             </a:fld>
             <a:endParaRPr lang="en-US"/>
           </a:p>
@@ -2400,7 +2400,7 @@
           <a:p>
             <a:fld id="{2F3E8B1C-86EF-43CF-8304-249481088644}" type="datetimeFigureOut">
               <a:rPr lang="en-US" smtClean="0"/>
-              <a:t>6/6/2021</a:t>
+              <a:t>6/7/2021</a:t>
             </a:fld>
             <a:endParaRPr lang="en-US"/>
           </a:p>
@@ -2688,7 +2688,7 @@
           <a:p>
             <a:fld id="{2F3E8B1C-86EF-43CF-8304-249481088644}" type="datetimeFigureOut">
               <a:rPr lang="en-US" smtClean="0"/>
-              <a:t>6/6/2021</a:t>
+              <a:t>6/7/2021</a:t>
             </a:fld>
             <a:endParaRPr lang="en-US"/>
           </a:p>
@@ -2930,7 +2930,7 @@
             <a:fld id="{2F3E8B1C-86EF-43CF-8304-249481088644}" type="datetimeFigureOut">
               <a:rPr lang="en-US" smtClean="0"/>
               <a:pPr/>
-              <a:t>6/6/2021</a:t>
+              <a:t>6/7/2021</a:t>
             </a:fld>
             <a:endParaRPr lang="en-US" dirty="0"/>
           </a:p>
@@ -5220,10 +5220,10 @@
       </p:grpSpPr>
       <p:grpSp>
         <p:nvGrpSpPr>
-          <p:cNvPr id="4" name="Group 3">
-            <a:extLst>
-              <a:ext uri="{FF2B5EF4-FFF2-40B4-BE49-F238E27FC236}">
-                <a16:creationId xmlns:a16="http://schemas.microsoft.com/office/drawing/2014/main" id="{1D053030-2A4A-490D-B626-6D4F313119ED}"/>
+          <p:cNvPr id="2" name="Group 1">
+            <a:extLst>
+              <a:ext uri="{FF2B5EF4-FFF2-40B4-BE49-F238E27FC236}">
+                <a16:creationId xmlns:a16="http://schemas.microsoft.com/office/drawing/2014/main" id="{42428DC1-9C0D-4309-B49C-127C90DEFED7}"/>
               </a:ext>
             </a:extLst>
           </p:cNvPr>
@@ -5238,12 +5238,905 @@
             <a:chExt cx="10149096" cy="6495169"/>
           </a:xfrm>
         </p:grpSpPr>
+        <p:grpSp>
+          <p:nvGrpSpPr>
+            <p:cNvPr id="4" name="Group 3">
+              <a:extLst>
+                <a:ext uri="{FF2B5EF4-FFF2-40B4-BE49-F238E27FC236}">
+                  <a16:creationId xmlns:a16="http://schemas.microsoft.com/office/drawing/2014/main" id="{1D053030-2A4A-490D-B626-6D4F313119ED}"/>
+                </a:ext>
+              </a:extLst>
+            </p:cNvPr>
+            <p:cNvGrpSpPr/>
+            <p:nvPr/>
+          </p:nvGrpSpPr>
+          <p:grpSpPr>
+            <a:xfrm>
+              <a:off x="1374250" y="234800"/>
+              <a:ext cx="10149096" cy="6495169"/>
+              <a:chOff x="1374250" y="234800"/>
+              <a:chExt cx="10149096" cy="6495169"/>
+            </a:xfrm>
+          </p:grpSpPr>
+          <p:pic>
+            <p:nvPicPr>
+              <p:cNvPr id="3" name="Picture 2" descr="Text&#10;&#10;Description automatically generated">
+                <a:extLst>
+                  <a:ext uri="{FF2B5EF4-FFF2-40B4-BE49-F238E27FC236}">
+                    <a16:creationId xmlns:a16="http://schemas.microsoft.com/office/drawing/2014/main" id="{7E302549-B47F-43D0-A97B-8C4308AB8FBB}"/>
+                  </a:ext>
+                </a:extLst>
+              </p:cNvPr>
+              <p:cNvPicPr>
+                <a:picLocks noChangeAspect="1"/>
+              </p:cNvPicPr>
+              <p:nvPr/>
+            </p:nvPicPr>
+            <p:blipFill>
+              <a:blip r:embed="rId2">
+                <a:extLst>
+                  <a:ext uri="{28A0092B-C50C-407E-A947-70E740481C1C}">
+                    <a14:useLocalDpi xmlns:a14="http://schemas.microsoft.com/office/drawing/2010/main" val="0"/>
+                  </a:ext>
+                </a:extLst>
+              </a:blip>
+              <a:stretch>
+                <a:fillRect/>
+              </a:stretch>
+            </p:blipFill>
+            <p:spPr>
+              <a:xfrm>
+                <a:off x="1374250" y="234800"/>
+                <a:ext cx="10149096" cy="6495169"/>
+              </a:xfrm>
+              <a:prstGeom prst="rect">
+                <a:avLst/>
+              </a:prstGeom>
+            </p:spPr>
+          </p:pic>
+          <p:sp>
+            <p:nvSpPr>
+              <p:cNvPr id="7" name="Rectangle 6">
+                <a:extLst>
+                  <a:ext uri="{FF2B5EF4-FFF2-40B4-BE49-F238E27FC236}">
+                    <a16:creationId xmlns:a16="http://schemas.microsoft.com/office/drawing/2014/main" id="{DCFE903F-E2A5-48B1-90B0-44BF61CF94AF}"/>
+                  </a:ext>
+                </a:extLst>
+              </p:cNvPr>
+              <p:cNvSpPr/>
+              <p:nvPr/>
+            </p:nvSpPr>
+            <p:spPr>
+              <a:xfrm>
+                <a:off x="1455420" y="3177540"/>
+                <a:ext cx="9989820" cy="3444240"/>
+              </a:xfrm>
+              <a:custGeom>
+                <a:avLst/>
+                <a:gdLst>
+                  <a:gd name="connsiteX0" fmla="*/ 0 w 9989820"/>
+                  <a:gd name="connsiteY0" fmla="*/ 0 h 3436620"/>
+                  <a:gd name="connsiteX1" fmla="*/ 9989820 w 9989820"/>
+                  <a:gd name="connsiteY1" fmla="*/ 0 h 3436620"/>
+                  <a:gd name="connsiteX2" fmla="*/ 9989820 w 9989820"/>
+                  <a:gd name="connsiteY2" fmla="*/ 3436620 h 3436620"/>
+                  <a:gd name="connsiteX3" fmla="*/ 0 w 9989820"/>
+                  <a:gd name="connsiteY3" fmla="*/ 3436620 h 3436620"/>
+                  <a:gd name="connsiteX4" fmla="*/ 0 w 9989820"/>
+                  <a:gd name="connsiteY4" fmla="*/ 0 h 3436620"/>
+                  <a:gd name="connsiteX0" fmla="*/ 0 w 9989820"/>
+                  <a:gd name="connsiteY0" fmla="*/ 7620 h 3444240"/>
+                  <a:gd name="connsiteX1" fmla="*/ 4632960 w 9989820"/>
+                  <a:gd name="connsiteY1" fmla="*/ 0 h 3444240"/>
+                  <a:gd name="connsiteX2" fmla="*/ 9989820 w 9989820"/>
+                  <a:gd name="connsiteY2" fmla="*/ 7620 h 3444240"/>
+                  <a:gd name="connsiteX3" fmla="*/ 9989820 w 9989820"/>
+                  <a:gd name="connsiteY3" fmla="*/ 3444240 h 3444240"/>
+                  <a:gd name="connsiteX4" fmla="*/ 0 w 9989820"/>
+                  <a:gd name="connsiteY4" fmla="*/ 3444240 h 3444240"/>
+                  <a:gd name="connsiteX5" fmla="*/ 0 w 9989820"/>
+                  <a:gd name="connsiteY5" fmla="*/ 7620 h 3444240"/>
+                  <a:gd name="connsiteX0" fmla="*/ 0 w 9989820"/>
+                  <a:gd name="connsiteY0" fmla="*/ 7620 h 3444240"/>
+                  <a:gd name="connsiteX1" fmla="*/ 4442460 w 9989820"/>
+                  <a:gd name="connsiteY1" fmla="*/ 7620 h 3444240"/>
+                  <a:gd name="connsiteX2" fmla="*/ 4632960 w 9989820"/>
+                  <a:gd name="connsiteY2" fmla="*/ 0 h 3444240"/>
+                  <a:gd name="connsiteX3" fmla="*/ 9989820 w 9989820"/>
+                  <a:gd name="connsiteY3" fmla="*/ 7620 h 3444240"/>
+                  <a:gd name="connsiteX4" fmla="*/ 9989820 w 9989820"/>
+                  <a:gd name="connsiteY4" fmla="*/ 3444240 h 3444240"/>
+                  <a:gd name="connsiteX5" fmla="*/ 0 w 9989820"/>
+                  <a:gd name="connsiteY5" fmla="*/ 3444240 h 3444240"/>
+                  <a:gd name="connsiteX6" fmla="*/ 0 w 9989820"/>
+                  <a:gd name="connsiteY6" fmla="*/ 7620 h 3444240"/>
+                  <a:gd name="connsiteX0" fmla="*/ 0 w 9989820"/>
+                  <a:gd name="connsiteY0" fmla="*/ 7620 h 3444240"/>
+                  <a:gd name="connsiteX1" fmla="*/ 4579620 w 9989820"/>
+                  <a:gd name="connsiteY1" fmla="*/ 510540 h 3444240"/>
+                  <a:gd name="connsiteX2" fmla="*/ 4632960 w 9989820"/>
+                  <a:gd name="connsiteY2" fmla="*/ 0 h 3444240"/>
+                  <a:gd name="connsiteX3" fmla="*/ 9989820 w 9989820"/>
+                  <a:gd name="connsiteY3" fmla="*/ 7620 h 3444240"/>
+                  <a:gd name="connsiteX4" fmla="*/ 9989820 w 9989820"/>
+                  <a:gd name="connsiteY4" fmla="*/ 3444240 h 3444240"/>
+                  <a:gd name="connsiteX5" fmla="*/ 0 w 9989820"/>
+                  <a:gd name="connsiteY5" fmla="*/ 3444240 h 3444240"/>
+                  <a:gd name="connsiteX6" fmla="*/ 0 w 9989820"/>
+                  <a:gd name="connsiteY6" fmla="*/ 7620 h 3444240"/>
+                  <a:gd name="connsiteX0" fmla="*/ 15240 w 9989820"/>
+                  <a:gd name="connsiteY0" fmla="*/ 472440 h 3444240"/>
+                  <a:gd name="connsiteX1" fmla="*/ 4579620 w 9989820"/>
+                  <a:gd name="connsiteY1" fmla="*/ 510540 h 3444240"/>
+                  <a:gd name="connsiteX2" fmla="*/ 4632960 w 9989820"/>
+                  <a:gd name="connsiteY2" fmla="*/ 0 h 3444240"/>
+                  <a:gd name="connsiteX3" fmla="*/ 9989820 w 9989820"/>
+                  <a:gd name="connsiteY3" fmla="*/ 7620 h 3444240"/>
+                  <a:gd name="connsiteX4" fmla="*/ 9989820 w 9989820"/>
+                  <a:gd name="connsiteY4" fmla="*/ 3444240 h 3444240"/>
+                  <a:gd name="connsiteX5" fmla="*/ 0 w 9989820"/>
+                  <a:gd name="connsiteY5" fmla="*/ 3444240 h 3444240"/>
+                  <a:gd name="connsiteX6" fmla="*/ 15240 w 9989820"/>
+                  <a:gd name="connsiteY6" fmla="*/ 472440 h 3444240"/>
+                  <a:gd name="connsiteX0" fmla="*/ 15240 w 9989820"/>
+                  <a:gd name="connsiteY0" fmla="*/ 472440 h 3444240"/>
+                  <a:gd name="connsiteX1" fmla="*/ 4579620 w 9989820"/>
+                  <a:gd name="connsiteY1" fmla="*/ 510540 h 3444240"/>
+                  <a:gd name="connsiteX2" fmla="*/ 4579620 w 9989820"/>
+                  <a:gd name="connsiteY2" fmla="*/ 0 h 3444240"/>
+                  <a:gd name="connsiteX3" fmla="*/ 9989820 w 9989820"/>
+                  <a:gd name="connsiteY3" fmla="*/ 7620 h 3444240"/>
+                  <a:gd name="connsiteX4" fmla="*/ 9989820 w 9989820"/>
+                  <a:gd name="connsiteY4" fmla="*/ 3444240 h 3444240"/>
+                  <a:gd name="connsiteX5" fmla="*/ 0 w 9989820"/>
+                  <a:gd name="connsiteY5" fmla="*/ 3444240 h 3444240"/>
+                  <a:gd name="connsiteX6" fmla="*/ 15240 w 9989820"/>
+                  <a:gd name="connsiteY6" fmla="*/ 472440 h 3444240"/>
+                  <a:gd name="connsiteX0" fmla="*/ 15240 w 9989820"/>
+                  <a:gd name="connsiteY0" fmla="*/ 563880 h 3444240"/>
+                  <a:gd name="connsiteX1" fmla="*/ 4579620 w 9989820"/>
+                  <a:gd name="connsiteY1" fmla="*/ 510540 h 3444240"/>
+                  <a:gd name="connsiteX2" fmla="*/ 4579620 w 9989820"/>
+                  <a:gd name="connsiteY2" fmla="*/ 0 h 3444240"/>
+                  <a:gd name="connsiteX3" fmla="*/ 9989820 w 9989820"/>
+                  <a:gd name="connsiteY3" fmla="*/ 7620 h 3444240"/>
+                  <a:gd name="connsiteX4" fmla="*/ 9989820 w 9989820"/>
+                  <a:gd name="connsiteY4" fmla="*/ 3444240 h 3444240"/>
+                  <a:gd name="connsiteX5" fmla="*/ 0 w 9989820"/>
+                  <a:gd name="connsiteY5" fmla="*/ 3444240 h 3444240"/>
+                  <a:gd name="connsiteX6" fmla="*/ 15240 w 9989820"/>
+                  <a:gd name="connsiteY6" fmla="*/ 563880 h 3444240"/>
+                  <a:gd name="connsiteX0" fmla="*/ 15240 w 9989820"/>
+                  <a:gd name="connsiteY0" fmla="*/ 563880 h 3444240"/>
+                  <a:gd name="connsiteX1" fmla="*/ 4589145 w 9989820"/>
+                  <a:gd name="connsiteY1" fmla="*/ 543878 h 3444240"/>
+                  <a:gd name="connsiteX2" fmla="*/ 4579620 w 9989820"/>
+                  <a:gd name="connsiteY2" fmla="*/ 0 h 3444240"/>
+                  <a:gd name="connsiteX3" fmla="*/ 9989820 w 9989820"/>
+                  <a:gd name="connsiteY3" fmla="*/ 7620 h 3444240"/>
+                  <a:gd name="connsiteX4" fmla="*/ 9989820 w 9989820"/>
+                  <a:gd name="connsiteY4" fmla="*/ 3444240 h 3444240"/>
+                  <a:gd name="connsiteX5" fmla="*/ 0 w 9989820"/>
+                  <a:gd name="connsiteY5" fmla="*/ 3444240 h 3444240"/>
+                  <a:gd name="connsiteX6" fmla="*/ 15240 w 9989820"/>
+                  <a:gd name="connsiteY6" fmla="*/ 563880 h 3444240"/>
+                  <a:gd name="connsiteX0" fmla="*/ 0 w 10007917"/>
+                  <a:gd name="connsiteY0" fmla="*/ 521018 h 3444240"/>
+                  <a:gd name="connsiteX1" fmla="*/ 4607242 w 10007917"/>
+                  <a:gd name="connsiteY1" fmla="*/ 543878 h 3444240"/>
+                  <a:gd name="connsiteX2" fmla="*/ 4597717 w 10007917"/>
+                  <a:gd name="connsiteY2" fmla="*/ 0 h 3444240"/>
+                  <a:gd name="connsiteX3" fmla="*/ 10007917 w 10007917"/>
+                  <a:gd name="connsiteY3" fmla="*/ 7620 h 3444240"/>
+                  <a:gd name="connsiteX4" fmla="*/ 10007917 w 10007917"/>
+                  <a:gd name="connsiteY4" fmla="*/ 3444240 h 3444240"/>
+                  <a:gd name="connsiteX5" fmla="*/ 18097 w 10007917"/>
+                  <a:gd name="connsiteY5" fmla="*/ 3444240 h 3444240"/>
+                  <a:gd name="connsiteX6" fmla="*/ 0 w 10007917"/>
+                  <a:gd name="connsiteY6" fmla="*/ 521018 h 3444240"/>
+                  <a:gd name="connsiteX0" fmla="*/ 5715 w 9989820"/>
+                  <a:gd name="connsiteY0" fmla="*/ 521018 h 3444240"/>
+                  <a:gd name="connsiteX1" fmla="*/ 4589145 w 9989820"/>
+                  <a:gd name="connsiteY1" fmla="*/ 543878 h 3444240"/>
+                  <a:gd name="connsiteX2" fmla="*/ 4579620 w 9989820"/>
+                  <a:gd name="connsiteY2" fmla="*/ 0 h 3444240"/>
+                  <a:gd name="connsiteX3" fmla="*/ 9989820 w 9989820"/>
+                  <a:gd name="connsiteY3" fmla="*/ 7620 h 3444240"/>
+                  <a:gd name="connsiteX4" fmla="*/ 9989820 w 9989820"/>
+                  <a:gd name="connsiteY4" fmla="*/ 3444240 h 3444240"/>
+                  <a:gd name="connsiteX5" fmla="*/ 0 w 9989820"/>
+                  <a:gd name="connsiteY5" fmla="*/ 3444240 h 3444240"/>
+                  <a:gd name="connsiteX6" fmla="*/ 5715 w 9989820"/>
+                  <a:gd name="connsiteY6" fmla="*/ 521018 h 3444240"/>
+                </a:gdLst>
+                <a:ahLst/>
+                <a:cxnLst>
+                  <a:cxn ang="0">
+                    <a:pos x="connsiteX0" y="connsiteY0"/>
+                  </a:cxn>
+                  <a:cxn ang="0">
+                    <a:pos x="connsiteX1" y="connsiteY1"/>
+                  </a:cxn>
+                  <a:cxn ang="0">
+                    <a:pos x="connsiteX2" y="connsiteY2"/>
+                  </a:cxn>
+                  <a:cxn ang="0">
+                    <a:pos x="connsiteX3" y="connsiteY3"/>
+                  </a:cxn>
+                  <a:cxn ang="0">
+                    <a:pos x="connsiteX4" y="connsiteY4"/>
+                  </a:cxn>
+                  <a:cxn ang="0">
+                    <a:pos x="connsiteX5" y="connsiteY5"/>
+                  </a:cxn>
+                  <a:cxn ang="0">
+                    <a:pos x="connsiteX6" y="connsiteY6"/>
+                  </a:cxn>
+                </a:cxnLst>
+                <a:rect l="l" t="t" r="r" b="b"/>
+                <a:pathLst>
+                  <a:path w="9989820" h="3444240">
+                    <a:moveTo>
+                      <a:pt x="5715" y="521018"/>
+                    </a:moveTo>
+                    <a:lnTo>
+                      <a:pt x="4589145" y="543878"/>
+                    </a:lnTo>
+                    <a:lnTo>
+                      <a:pt x="4579620" y="0"/>
+                    </a:lnTo>
+                    <a:lnTo>
+                      <a:pt x="9989820" y="7620"/>
+                    </a:lnTo>
+                    <a:lnTo>
+                      <a:pt x="9989820" y="3444240"/>
+                    </a:lnTo>
+                    <a:lnTo>
+                      <a:pt x="0" y="3444240"/>
+                    </a:lnTo>
+                    <a:lnTo>
+                      <a:pt x="5715" y="521018"/>
+                    </a:lnTo>
+                    <a:close/>
+                  </a:path>
+                </a:pathLst>
+              </a:custGeom>
+              <a:noFill/>
+              <a:ln w="19050">
+                <a:solidFill>
+                  <a:srgbClr val="FFC000"/>
+                </a:solidFill>
+              </a:ln>
+            </p:spPr>
+            <p:style>
+              <a:lnRef idx="2">
+                <a:schemeClr val="accent1">
+                  <a:shade val="50000"/>
+                </a:schemeClr>
+              </a:lnRef>
+              <a:fillRef idx="1">
+                <a:schemeClr val="accent1"/>
+              </a:fillRef>
+              <a:effectRef idx="0">
+                <a:schemeClr val="accent1"/>
+              </a:effectRef>
+              <a:fontRef idx="minor">
+                <a:schemeClr val="lt1"/>
+              </a:fontRef>
+            </p:style>
+            <p:txBody>
+              <a:bodyPr rtlCol="0" anchor="ctr"/>
+              <a:lstStyle/>
+              <a:p>
+                <a:pPr algn="ctr"/>
+                <a:endParaRPr lang="en-IL" dirty="0"/>
+              </a:p>
+            </p:txBody>
+          </p:sp>
+          <p:sp>
+            <p:nvSpPr>
+              <p:cNvPr id="8" name="Rectangle 7">
+                <a:extLst>
+                  <a:ext uri="{FF2B5EF4-FFF2-40B4-BE49-F238E27FC236}">
+                    <a16:creationId xmlns:a16="http://schemas.microsoft.com/office/drawing/2014/main" id="{24387B52-F2F4-4788-81B4-2A40FF191C45}"/>
+                  </a:ext>
+                </a:extLst>
+              </p:cNvPr>
+              <p:cNvSpPr/>
+              <p:nvPr/>
+            </p:nvSpPr>
+            <p:spPr>
+              <a:xfrm>
+                <a:off x="1455420" y="312420"/>
+                <a:ext cx="2392680" cy="3337530"/>
+              </a:xfrm>
+              <a:prstGeom prst="rect">
+                <a:avLst/>
+              </a:prstGeom>
+              <a:noFill/>
+              <a:ln w="19050">
+                <a:solidFill>
+                  <a:srgbClr val="FFC000"/>
+                </a:solidFill>
+              </a:ln>
+            </p:spPr>
+            <p:style>
+              <a:lnRef idx="2">
+                <a:schemeClr val="accent1">
+                  <a:shade val="50000"/>
+                </a:schemeClr>
+              </a:lnRef>
+              <a:fillRef idx="1">
+                <a:schemeClr val="accent1"/>
+              </a:fillRef>
+              <a:effectRef idx="0">
+                <a:schemeClr val="accent1"/>
+              </a:effectRef>
+              <a:fontRef idx="minor">
+                <a:schemeClr val="lt1"/>
+              </a:fontRef>
+            </p:style>
+            <p:txBody>
+              <a:bodyPr rtlCol="0" anchor="ctr"/>
+              <a:lstStyle/>
+              <a:p>
+                <a:pPr algn="ctr"/>
+                <a:endParaRPr lang="en-IL"/>
+              </a:p>
+            </p:txBody>
+          </p:sp>
+          <p:sp>
+            <p:nvSpPr>
+              <p:cNvPr id="9" name="Rectangle 8">
+                <a:extLst>
+                  <a:ext uri="{FF2B5EF4-FFF2-40B4-BE49-F238E27FC236}">
+                    <a16:creationId xmlns:a16="http://schemas.microsoft.com/office/drawing/2014/main" id="{0257EB90-92C4-464F-A8B1-63DD03465A8F}"/>
+                  </a:ext>
+                </a:extLst>
+              </p:cNvPr>
+              <p:cNvSpPr/>
+              <p:nvPr/>
+            </p:nvSpPr>
+            <p:spPr>
+              <a:xfrm>
+                <a:off x="4229100" y="289560"/>
+                <a:ext cx="3139440" cy="3360390"/>
+              </a:xfrm>
+              <a:custGeom>
+                <a:avLst/>
+                <a:gdLst>
+                  <a:gd name="connsiteX0" fmla="*/ 0 w 1714500"/>
+                  <a:gd name="connsiteY0" fmla="*/ 0 h 3337530"/>
+                  <a:gd name="connsiteX1" fmla="*/ 1714500 w 1714500"/>
+                  <a:gd name="connsiteY1" fmla="*/ 0 h 3337530"/>
+                  <a:gd name="connsiteX2" fmla="*/ 1714500 w 1714500"/>
+                  <a:gd name="connsiteY2" fmla="*/ 3337530 h 3337530"/>
+                  <a:gd name="connsiteX3" fmla="*/ 0 w 1714500"/>
+                  <a:gd name="connsiteY3" fmla="*/ 3337530 h 3337530"/>
+                  <a:gd name="connsiteX4" fmla="*/ 0 w 1714500"/>
+                  <a:gd name="connsiteY4" fmla="*/ 0 h 3337530"/>
+                  <a:gd name="connsiteX0" fmla="*/ 0 w 1714500"/>
+                  <a:gd name="connsiteY0" fmla="*/ 0 h 3337530"/>
+                  <a:gd name="connsiteX1" fmla="*/ 1714500 w 1714500"/>
+                  <a:gd name="connsiteY1" fmla="*/ 0 h 3337530"/>
+                  <a:gd name="connsiteX2" fmla="*/ 1714500 w 1714500"/>
+                  <a:gd name="connsiteY2" fmla="*/ 2750820 h 3337530"/>
+                  <a:gd name="connsiteX3" fmla="*/ 1714500 w 1714500"/>
+                  <a:gd name="connsiteY3" fmla="*/ 3337530 h 3337530"/>
+                  <a:gd name="connsiteX4" fmla="*/ 0 w 1714500"/>
+                  <a:gd name="connsiteY4" fmla="*/ 3337530 h 3337530"/>
+                  <a:gd name="connsiteX5" fmla="*/ 0 w 1714500"/>
+                  <a:gd name="connsiteY5" fmla="*/ 0 h 3337530"/>
+                  <a:gd name="connsiteX0" fmla="*/ 0 w 1714500"/>
+                  <a:gd name="connsiteY0" fmla="*/ 0 h 3337530"/>
+                  <a:gd name="connsiteX1" fmla="*/ 1714500 w 1714500"/>
+                  <a:gd name="connsiteY1" fmla="*/ 0 h 3337530"/>
+                  <a:gd name="connsiteX2" fmla="*/ 1714500 w 1714500"/>
+                  <a:gd name="connsiteY2" fmla="*/ 121920 h 3337530"/>
+                  <a:gd name="connsiteX3" fmla="*/ 1714500 w 1714500"/>
+                  <a:gd name="connsiteY3" fmla="*/ 2750820 h 3337530"/>
+                  <a:gd name="connsiteX4" fmla="*/ 1714500 w 1714500"/>
+                  <a:gd name="connsiteY4" fmla="*/ 3337530 h 3337530"/>
+                  <a:gd name="connsiteX5" fmla="*/ 0 w 1714500"/>
+                  <a:gd name="connsiteY5" fmla="*/ 3337530 h 3337530"/>
+                  <a:gd name="connsiteX6" fmla="*/ 0 w 1714500"/>
+                  <a:gd name="connsiteY6" fmla="*/ 0 h 3337530"/>
+                  <a:gd name="connsiteX0" fmla="*/ 0 w 3139440"/>
+                  <a:gd name="connsiteY0" fmla="*/ 0 h 3337530"/>
+                  <a:gd name="connsiteX1" fmla="*/ 1714500 w 3139440"/>
+                  <a:gd name="connsiteY1" fmla="*/ 0 h 3337530"/>
+                  <a:gd name="connsiteX2" fmla="*/ 3139440 w 3139440"/>
+                  <a:gd name="connsiteY2" fmla="*/ 2758440 h 3337530"/>
+                  <a:gd name="connsiteX3" fmla="*/ 1714500 w 3139440"/>
+                  <a:gd name="connsiteY3" fmla="*/ 2750820 h 3337530"/>
+                  <a:gd name="connsiteX4" fmla="*/ 1714500 w 3139440"/>
+                  <a:gd name="connsiteY4" fmla="*/ 3337530 h 3337530"/>
+                  <a:gd name="connsiteX5" fmla="*/ 0 w 3139440"/>
+                  <a:gd name="connsiteY5" fmla="*/ 3337530 h 3337530"/>
+                  <a:gd name="connsiteX6" fmla="*/ 0 w 3139440"/>
+                  <a:gd name="connsiteY6" fmla="*/ 0 h 3337530"/>
+                  <a:gd name="connsiteX0" fmla="*/ 0 w 3139440"/>
+                  <a:gd name="connsiteY0" fmla="*/ 22860 h 3360390"/>
+                  <a:gd name="connsiteX1" fmla="*/ 3131820 w 3139440"/>
+                  <a:gd name="connsiteY1" fmla="*/ 0 h 3360390"/>
+                  <a:gd name="connsiteX2" fmla="*/ 3139440 w 3139440"/>
+                  <a:gd name="connsiteY2" fmla="*/ 2781300 h 3360390"/>
+                  <a:gd name="connsiteX3" fmla="*/ 1714500 w 3139440"/>
+                  <a:gd name="connsiteY3" fmla="*/ 2773680 h 3360390"/>
+                  <a:gd name="connsiteX4" fmla="*/ 1714500 w 3139440"/>
+                  <a:gd name="connsiteY4" fmla="*/ 3360390 h 3360390"/>
+                  <a:gd name="connsiteX5" fmla="*/ 0 w 3139440"/>
+                  <a:gd name="connsiteY5" fmla="*/ 3360390 h 3360390"/>
+                  <a:gd name="connsiteX6" fmla="*/ 0 w 3139440"/>
+                  <a:gd name="connsiteY6" fmla="*/ 22860 h 3360390"/>
+                </a:gdLst>
+                <a:ahLst/>
+                <a:cxnLst>
+                  <a:cxn ang="0">
+                    <a:pos x="connsiteX0" y="connsiteY0"/>
+                  </a:cxn>
+                  <a:cxn ang="0">
+                    <a:pos x="connsiteX1" y="connsiteY1"/>
+                  </a:cxn>
+                  <a:cxn ang="0">
+                    <a:pos x="connsiteX2" y="connsiteY2"/>
+                  </a:cxn>
+                  <a:cxn ang="0">
+                    <a:pos x="connsiteX3" y="connsiteY3"/>
+                  </a:cxn>
+                  <a:cxn ang="0">
+                    <a:pos x="connsiteX4" y="connsiteY4"/>
+                  </a:cxn>
+                  <a:cxn ang="0">
+                    <a:pos x="connsiteX5" y="connsiteY5"/>
+                  </a:cxn>
+                  <a:cxn ang="0">
+                    <a:pos x="connsiteX6" y="connsiteY6"/>
+                  </a:cxn>
+                </a:cxnLst>
+                <a:rect l="l" t="t" r="r" b="b"/>
+                <a:pathLst>
+                  <a:path w="3139440" h="3360390">
+                    <a:moveTo>
+                      <a:pt x="0" y="22860"/>
+                    </a:moveTo>
+                    <a:lnTo>
+                      <a:pt x="3131820" y="0"/>
+                    </a:lnTo>
+                    <a:lnTo>
+                      <a:pt x="3139440" y="2781300"/>
+                    </a:lnTo>
+                    <a:lnTo>
+                      <a:pt x="1714500" y="2773680"/>
+                    </a:lnTo>
+                    <a:lnTo>
+                      <a:pt x="1714500" y="3360390"/>
+                    </a:lnTo>
+                    <a:lnTo>
+                      <a:pt x="0" y="3360390"/>
+                    </a:lnTo>
+                    <a:lnTo>
+                      <a:pt x="0" y="22860"/>
+                    </a:lnTo>
+                    <a:close/>
+                  </a:path>
+                </a:pathLst>
+              </a:custGeom>
+              <a:noFill/>
+              <a:ln w="19050">
+                <a:solidFill>
+                  <a:srgbClr val="FFC000"/>
+                </a:solidFill>
+              </a:ln>
+            </p:spPr>
+            <p:style>
+              <a:lnRef idx="2">
+                <a:schemeClr val="accent1">
+                  <a:shade val="50000"/>
+                </a:schemeClr>
+              </a:lnRef>
+              <a:fillRef idx="1">
+                <a:schemeClr val="accent1"/>
+              </a:fillRef>
+              <a:effectRef idx="0">
+                <a:schemeClr val="accent1"/>
+              </a:effectRef>
+              <a:fontRef idx="minor">
+                <a:schemeClr val="lt1"/>
+              </a:fontRef>
+            </p:style>
+            <p:txBody>
+              <a:bodyPr rtlCol="0" anchor="ctr"/>
+              <a:lstStyle/>
+              <a:p>
+                <a:pPr algn="ctr"/>
+                <a:endParaRPr lang="en-IL"/>
+              </a:p>
+            </p:txBody>
+          </p:sp>
+          <p:sp>
+            <p:nvSpPr>
+              <p:cNvPr id="10" name="Rectangle 9">
+                <a:extLst>
+                  <a:ext uri="{FF2B5EF4-FFF2-40B4-BE49-F238E27FC236}">
+                    <a16:creationId xmlns:a16="http://schemas.microsoft.com/office/drawing/2014/main" id="{E5A5EA5C-7045-43A7-855D-BF7CD19C3E6B}"/>
+                  </a:ext>
+                </a:extLst>
+              </p:cNvPr>
+              <p:cNvSpPr/>
+              <p:nvPr/>
+            </p:nvSpPr>
+            <p:spPr>
+              <a:xfrm>
+                <a:off x="2409356" y="3846651"/>
+                <a:ext cx="957250" cy="523220"/>
+              </a:xfrm>
+              <a:prstGeom prst="rect">
+                <a:avLst/>
+              </a:prstGeom>
+              <a:noFill/>
+            </p:spPr>
+            <p:txBody>
+              <a:bodyPr wrap="none" lIns="91440" tIns="45720" rIns="91440" bIns="45720">
+                <a:spAutoFit/>
+              </a:bodyPr>
+              <a:lstStyle/>
+              <a:p>
+                <a:pPr algn="ctr"/>
+                <a:r>
+                  <a:rPr lang="en-US" sz="2800" b="0" cap="none" spc="0" dirty="0">
+                    <a:ln w="0"/>
+                    <a:solidFill>
+                      <a:srgbClr val="FFC000"/>
+                    </a:solidFill>
+                    <a:effectLst>
+                      <a:outerShdw blurRad="38100" dist="25400" dir="5400000" algn="ctr" rotWithShape="0">
+                        <a:srgbClr val="6E747A">
+                          <a:alpha val="43000"/>
+                        </a:srgbClr>
+                      </a:outerShdw>
+                    </a:effectLst>
+                  </a:rPr>
+                  <a:t>View</a:t>
+                </a:r>
+              </a:p>
+            </p:txBody>
+          </p:sp>
+          <p:sp>
+            <p:nvSpPr>
+              <p:cNvPr id="11" name="Rectangle 10">
+                <a:extLst>
+                  <a:ext uri="{FF2B5EF4-FFF2-40B4-BE49-F238E27FC236}">
+                    <a16:creationId xmlns:a16="http://schemas.microsoft.com/office/drawing/2014/main" id="{D230C6C9-2DB2-4572-A5EF-1EEF40DE3341}"/>
+                  </a:ext>
+                </a:extLst>
+              </p:cNvPr>
+              <p:cNvSpPr/>
+              <p:nvPr/>
+            </p:nvSpPr>
+            <p:spPr>
+              <a:xfrm>
+                <a:off x="1703623" y="627370"/>
+                <a:ext cx="1938287" cy="523220"/>
+              </a:xfrm>
+              <a:prstGeom prst="rect">
+                <a:avLst/>
+              </a:prstGeom>
+              <a:noFill/>
+            </p:spPr>
+            <p:txBody>
+              <a:bodyPr wrap="none" lIns="91440" tIns="45720" rIns="91440" bIns="45720">
+                <a:spAutoFit/>
+              </a:bodyPr>
+              <a:lstStyle/>
+              <a:p>
+                <a:pPr algn="ctr"/>
+                <a:r>
+                  <a:rPr lang="en-US" sz="2800" b="0" cap="none" spc="0" dirty="0">
+                    <a:ln w="0"/>
+                    <a:solidFill>
+                      <a:srgbClr val="FFC000"/>
+                    </a:solidFill>
+                    <a:effectLst>
+                      <a:outerShdw blurRad="38100" dist="25400" dir="5400000" algn="ctr" rotWithShape="0">
+                        <a:srgbClr val="6E747A">
+                          <a:alpha val="43000"/>
+                        </a:srgbClr>
+                      </a:outerShdw>
+                    </a:effectLst>
+                  </a:rPr>
+                  <a:t>ViewModel</a:t>
+                </a:r>
+              </a:p>
+            </p:txBody>
+          </p:sp>
+          <p:sp>
+            <p:nvSpPr>
+              <p:cNvPr id="12" name="Rectangle 11">
+                <a:extLst>
+                  <a:ext uri="{FF2B5EF4-FFF2-40B4-BE49-F238E27FC236}">
+                    <a16:creationId xmlns:a16="http://schemas.microsoft.com/office/drawing/2014/main" id="{912E8A78-8249-40E5-B825-B321BA8D05DF}"/>
+                  </a:ext>
+                </a:extLst>
+              </p:cNvPr>
+              <p:cNvSpPr/>
+              <p:nvPr/>
+            </p:nvSpPr>
+            <p:spPr>
+              <a:xfrm>
+                <a:off x="6038928" y="365760"/>
+                <a:ext cx="1165704" cy="523220"/>
+              </a:xfrm>
+              <a:prstGeom prst="rect">
+                <a:avLst/>
+              </a:prstGeom>
+              <a:noFill/>
+            </p:spPr>
+            <p:txBody>
+              <a:bodyPr wrap="none" lIns="91440" tIns="45720" rIns="91440" bIns="45720">
+                <a:spAutoFit/>
+              </a:bodyPr>
+              <a:lstStyle/>
+              <a:p>
+                <a:pPr algn="ctr"/>
+                <a:r>
+                  <a:rPr lang="en-US" sz="2800" b="0" cap="none" spc="0" dirty="0">
+                    <a:ln w="0"/>
+                    <a:solidFill>
+                      <a:srgbClr val="FFC000"/>
+                    </a:solidFill>
+                    <a:effectLst>
+                      <a:outerShdw blurRad="38100" dist="25400" dir="5400000" algn="ctr" rotWithShape="0">
+                        <a:srgbClr val="6E747A">
+                          <a:alpha val="43000"/>
+                        </a:srgbClr>
+                      </a:outerShdw>
+                    </a:effectLst>
+                  </a:rPr>
+                  <a:t>Model</a:t>
+                </a:r>
+              </a:p>
+            </p:txBody>
+          </p:sp>
+        </p:grpSp>
         <p:pic>
           <p:nvPicPr>
-            <p:cNvPr id="3" name="Picture 2" descr="Text&#10;&#10;Description automatically generated">
+            <p:cNvPr id="13" name="Picture 12">
               <a:extLst>
                 <a:ext uri="{FF2B5EF4-FFF2-40B4-BE49-F238E27FC236}">
-                  <a16:creationId xmlns:a16="http://schemas.microsoft.com/office/drawing/2014/main" id="{7E302549-B47F-43D0-A97B-8C4308AB8FBB}"/>
+                  <a16:creationId xmlns:a16="http://schemas.microsoft.com/office/drawing/2014/main" id="{1B6A376F-A85B-4C64-AAEF-650443ED3F28}"/>
+                </a:ext>
+              </a:extLst>
+            </p:cNvPr>
+            <p:cNvPicPr>
+              <a:picLocks noChangeAspect="1"/>
+            </p:cNvPicPr>
+            <p:nvPr/>
+          </p:nvPicPr>
+          <p:blipFill rotWithShape="1">
+            <a:blip r:embed="rId3"/>
+            <a:srcRect l="51702" t="6980" r="5176" b="88899"/>
+            <a:stretch/>
+          </p:blipFill>
+          <p:spPr>
+            <a:xfrm>
+              <a:off x="5310265" y="997121"/>
+              <a:ext cx="569896" cy="128802"/>
+            </a:xfrm>
+            <a:prstGeom prst="rect">
+              <a:avLst/>
+            </a:prstGeom>
+          </p:spPr>
+        </p:pic>
+        <p:pic>
+          <p:nvPicPr>
+            <p:cNvPr id="14" name="Picture 13">
+              <a:extLst>
+                <a:ext uri="{FF2B5EF4-FFF2-40B4-BE49-F238E27FC236}">
+                  <a16:creationId xmlns:a16="http://schemas.microsoft.com/office/drawing/2014/main" id="{D0490DC3-CE79-46C1-81B7-08258FA840A3}"/>
+                </a:ext>
+              </a:extLst>
+            </p:cNvPr>
+            <p:cNvPicPr>
+              <a:picLocks noChangeAspect="1"/>
+            </p:cNvPicPr>
+            <p:nvPr/>
+          </p:nvPicPr>
+          <p:blipFill rotWithShape="1">
+            <a:blip r:embed="rId3"/>
+            <a:srcRect l="20411" t="6980" r="56243" b="88899"/>
+            <a:stretch/>
+          </p:blipFill>
+          <p:spPr>
+            <a:xfrm>
+              <a:off x="4801611" y="985838"/>
+              <a:ext cx="335580" cy="140085"/>
+            </a:xfrm>
+            <a:prstGeom prst="rect">
+              <a:avLst/>
+            </a:prstGeom>
+          </p:spPr>
+        </p:pic>
+        <p:pic>
+          <p:nvPicPr>
+            <p:cNvPr id="23" name="Picture 22">
+              <a:extLst>
+                <a:ext uri="{FF2B5EF4-FFF2-40B4-BE49-F238E27FC236}">
+                  <a16:creationId xmlns:a16="http://schemas.microsoft.com/office/drawing/2014/main" id="{3031842C-6753-47D5-8216-BD0EC4530083}"/>
+                </a:ext>
+              </a:extLst>
+            </p:cNvPr>
+            <p:cNvPicPr>
+              <a:picLocks noChangeAspect="1"/>
+            </p:cNvPicPr>
+            <p:nvPr/>
+          </p:nvPicPr>
+          <p:blipFill rotWithShape="1">
+            <a:blip r:embed="rId4"/>
+            <a:srcRect r="1606" b="84324"/>
+            <a:stretch/>
+          </p:blipFill>
+          <p:spPr>
+            <a:xfrm>
+              <a:off x="4567312" y="1969756"/>
+              <a:ext cx="1312850" cy="259860"/>
+            </a:xfrm>
+            <a:prstGeom prst="rect">
+              <a:avLst/>
+            </a:prstGeom>
+          </p:spPr>
+        </p:pic>
+        <p:pic>
+          <p:nvPicPr>
+            <p:cNvPr id="26" name="Picture 25">
+              <a:extLst>
+                <a:ext uri="{FF2B5EF4-FFF2-40B4-BE49-F238E27FC236}">
+                  <a16:creationId xmlns:a16="http://schemas.microsoft.com/office/drawing/2014/main" id="{F24F8A2D-EBE6-47AB-90B4-82321737E8AC}"/>
+                </a:ext>
+              </a:extLst>
+            </p:cNvPr>
+            <p:cNvPicPr>
+              <a:picLocks noChangeAspect="1"/>
+            </p:cNvPicPr>
+            <p:nvPr/>
+          </p:nvPicPr>
+          <p:blipFill rotWithShape="1">
+            <a:blip r:embed="rId4"/>
+            <a:srcRect t="74748" r="1482" b="16960"/>
+            <a:stretch/>
+          </p:blipFill>
+          <p:spPr>
+            <a:xfrm>
+              <a:off x="4567312" y="2773803"/>
+              <a:ext cx="1314515" cy="137455"/>
+            </a:xfrm>
+            <a:prstGeom prst="rect">
+              <a:avLst/>
+            </a:prstGeom>
+          </p:spPr>
+        </p:pic>
+        <p:pic>
+          <p:nvPicPr>
+            <p:cNvPr id="27" name="Picture 26">
+              <a:extLst>
+                <a:ext uri="{FF2B5EF4-FFF2-40B4-BE49-F238E27FC236}">
+                  <a16:creationId xmlns:a16="http://schemas.microsoft.com/office/drawing/2014/main" id="{876E37F4-146C-4BFB-9298-008C3C8202B3}"/>
+                </a:ext>
+              </a:extLst>
+            </p:cNvPr>
+            <p:cNvPicPr>
+              <a:picLocks noChangeAspect="1"/>
+            </p:cNvPicPr>
+            <p:nvPr/>
+          </p:nvPicPr>
+          <p:blipFill rotWithShape="1">
+            <a:blip r:embed="rId4"/>
+            <a:srcRect t="42106" r="1606" b="34001"/>
+            <a:stretch/>
+          </p:blipFill>
+          <p:spPr>
+            <a:xfrm>
+              <a:off x="4573600" y="2237440"/>
+              <a:ext cx="1312849" cy="396082"/>
+            </a:xfrm>
+            <a:prstGeom prst="rect">
+              <a:avLst/>
+            </a:prstGeom>
+          </p:spPr>
+        </p:pic>
+        <p:pic>
+          <p:nvPicPr>
+            <p:cNvPr id="29" name="Picture 28">
+              <a:extLst>
+                <a:ext uri="{FF2B5EF4-FFF2-40B4-BE49-F238E27FC236}">
+                  <a16:creationId xmlns:a16="http://schemas.microsoft.com/office/drawing/2014/main" id="{A0CF4DD9-817E-4906-983B-1CC44909FE36}"/>
+                </a:ext>
+              </a:extLst>
+            </p:cNvPr>
+            <p:cNvPicPr>
+              <a:picLocks noChangeAspect="1"/>
+            </p:cNvPicPr>
+            <p:nvPr/>
+          </p:nvPicPr>
+          <p:blipFill rotWithShape="1">
+            <a:blip r:embed="rId5"/>
+            <a:srcRect l="58032" t="38954" r="-325" b="2432"/>
+            <a:stretch/>
+          </p:blipFill>
+          <p:spPr>
+            <a:xfrm>
+              <a:off x="4471193" y="3069351"/>
+              <a:ext cx="1450976" cy="557292"/>
+            </a:xfrm>
+            <a:prstGeom prst="rect">
+              <a:avLst/>
+            </a:prstGeom>
+          </p:spPr>
+        </p:pic>
+        <p:pic>
+          <p:nvPicPr>
+            <p:cNvPr id="30" name="Picture 29">
+              <a:extLst>
+                <a:ext uri="{FF2B5EF4-FFF2-40B4-BE49-F238E27FC236}">
+                  <a16:creationId xmlns:a16="http://schemas.microsoft.com/office/drawing/2014/main" id="{129B25A1-A4DA-4709-8323-E9B3062ED6A2}"/>
+                </a:ext>
+              </a:extLst>
+            </p:cNvPr>
+            <p:cNvPicPr>
+              <a:picLocks noChangeAspect="1"/>
+            </p:cNvPicPr>
+            <p:nvPr/>
+          </p:nvPicPr>
+          <p:blipFill rotWithShape="1">
+            <a:blip r:embed="rId4"/>
+            <a:srcRect t="92566" r="1482"/>
+            <a:stretch/>
+          </p:blipFill>
+          <p:spPr>
+            <a:xfrm>
+              <a:off x="4567312" y="2930658"/>
+              <a:ext cx="1314515" cy="123232"/>
+            </a:xfrm>
+            <a:prstGeom prst="rect">
+              <a:avLst/>
+            </a:prstGeom>
+          </p:spPr>
+        </p:pic>
+        <p:pic>
+          <p:nvPicPr>
+            <p:cNvPr id="31" name="Picture 30">
+              <a:extLst>
+                <a:ext uri="{FF2B5EF4-FFF2-40B4-BE49-F238E27FC236}">
+                  <a16:creationId xmlns:a16="http://schemas.microsoft.com/office/drawing/2014/main" id="{4E6C6AAF-EF51-47A5-A904-859E4FA91625}"/>
+                </a:ext>
+              </a:extLst>
+            </p:cNvPr>
+            <p:cNvPicPr>
+              <a:picLocks noChangeAspect="1"/>
+            </p:cNvPicPr>
+            <p:nvPr/>
+          </p:nvPicPr>
+          <p:blipFill rotWithShape="1">
+            <a:blip r:embed="rId4"/>
+            <a:srcRect t="24289" r="1606" b="67419"/>
+            <a:stretch/>
+          </p:blipFill>
+          <p:spPr>
+            <a:xfrm>
+              <a:off x="4573600" y="2631377"/>
+              <a:ext cx="1312850" cy="137454"/>
+            </a:xfrm>
+            <a:prstGeom prst="rect">
+              <a:avLst/>
+            </a:prstGeom>
+          </p:spPr>
+        </p:pic>
+        <p:pic>
+          <p:nvPicPr>
+            <p:cNvPr id="33" name="Picture 32">
+              <a:extLst>
+                <a:ext uri="{FF2B5EF4-FFF2-40B4-BE49-F238E27FC236}">
+                  <a16:creationId xmlns:a16="http://schemas.microsoft.com/office/drawing/2014/main" id="{150AA7EB-34CF-47DD-ADCA-BA8260611C7D}"/>
                 </a:ext>
               </a:extLst>
             </p:cNvPr>
@@ -5253,636 +6146,55 @@
             <p:nvPr/>
           </p:nvPicPr>
           <p:blipFill>
-            <a:blip r:embed="rId2">
-              <a:extLst>
-                <a:ext uri="{28A0092B-C50C-407E-A947-70E740481C1C}">
-                  <a14:useLocalDpi xmlns:a14="http://schemas.microsoft.com/office/drawing/2010/main" val="0"/>
-                </a:ext>
-              </a:extLst>
-            </a:blip>
+            <a:blip r:embed="rId6"/>
             <a:stretch>
               <a:fillRect/>
             </a:stretch>
           </p:blipFill>
           <p:spPr>
             <a:xfrm>
-              <a:off x="1374250" y="234800"/>
-              <a:ext cx="10149096" cy="6495169"/>
+              <a:off x="4534638" y="475101"/>
+              <a:ext cx="1390952" cy="783904"/>
             </a:xfrm>
             <a:prstGeom prst="rect">
               <a:avLst/>
             </a:prstGeom>
           </p:spPr>
         </p:pic>
-        <p:sp>
-          <p:nvSpPr>
-            <p:cNvPr id="7" name="Rectangle 6">
+        <p:pic>
+          <p:nvPicPr>
+            <p:cNvPr id="35" name="Picture 34">
               <a:extLst>
                 <a:ext uri="{FF2B5EF4-FFF2-40B4-BE49-F238E27FC236}">
-                  <a16:creationId xmlns:a16="http://schemas.microsoft.com/office/drawing/2014/main" id="{DCFE903F-E2A5-48B1-90B0-44BF61CF94AF}"/>
+                  <a16:creationId xmlns:a16="http://schemas.microsoft.com/office/drawing/2014/main" id="{78E88D5D-242D-4D48-9E21-BFF0B9D4F6C9}"/>
                 </a:ext>
               </a:extLst>
             </p:cNvPr>
-            <p:cNvSpPr/>
+            <p:cNvPicPr>
+              <a:picLocks noChangeAspect="1"/>
+            </p:cNvPicPr>
             <p:nvPr/>
-          </p:nvSpPr>
+          </p:nvPicPr>
+          <p:blipFill rotWithShape="1">
+            <a:blip r:embed="rId7"/>
+            <a:srcRect t="63703" b="-1"/>
+            <a:stretch/>
+          </p:blipFill>
           <p:spPr>
             <a:xfrm>
-              <a:off x="1455420" y="3177540"/>
-              <a:ext cx="9989820" cy="3444240"/>
-            </a:xfrm>
-            <a:custGeom>
-              <a:avLst/>
-              <a:gdLst>
-                <a:gd name="connsiteX0" fmla="*/ 0 w 9989820"/>
-                <a:gd name="connsiteY0" fmla="*/ 0 h 3436620"/>
-                <a:gd name="connsiteX1" fmla="*/ 9989820 w 9989820"/>
-                <a:gd name="connsiteY1" fmla="*/ 0 h 3436620"/>
-                <a:gd name="connsiteX2" fmla="*/ 9989820 w 9989820"/>
-                <a:gd name="connsiteY2" fmla="*/ 3436620 h 3436620"/>
-                <a:gd name="connsiteX3" fmla="*/ 0 w 9989820"/>
-                <a:gd name="connsiteY3" fmla="*/ 3436620 h 3436620"/>
-                <a:gd name="connsiteX4" fmla="*/ 0 w 9989820"/>
-                <a:gd name="connsiteY4" fmla="*/ 0 h 3436620"/>
-                <a:gd name="connsiteX0" fmla="*/ 0 w 9989820"/>
-                <a:gd name="connsiteY0" fmla="*/ 7620 h 3444240"/>
-                <a:gd name="connsiteX1" fmla="*/ 4632960 w 9989820"/>
-                <a:gd name="connsiteY1" fmla="*/ 0 h 3444240"/>
-                <a:gd name="connsiteX2" fmla="*/ 9989820 w 9989820"/>
-                <a:gd name="connsiteY2" fmla="*/ 7620 h 3444240"/>
-                <a:gd name="connsiteX3" fmla="*/ 9989820 w 9989820"/>
-                <a:gd name="connsiteY3" fmla="*/ 3444240 h 3444240"/>
-                <a:gd name="connsiteX4" fmla="*/ 0 w 9989820"/>
-                <a:gd name="connsiteY4" fmla="*/ 3444240 h 3444240"/>
-                <a:gd name="connsiteX5" fmla="*/ 0 w 9989820"/>
-                <a:gd name="connsiteY5" fmla="*/ 7620 h 3444240"/>
-                <a:gd name="connsiteX0" fmla="*/ 0 w 9989820"/>
-                <a:gd name="connsiteY0" fmla="*/ 7620 h 3444240"/>
-                <a:gd name="connsiteX1" fmla="*/ 4442460 w 9989820"/>
-                <a:gd name="connsiteY1" fmla="*/ 7620 h 3444240"/>
-                <a:gd name="connsiteX2" fmla="*/ 4632960 w 9989820"/>
-                <a:gd name="connsiteY2" fmla="*/ 0 h 3444240"/>
-                <a:gd name="connsiteX3" fmla="*/ 9989820 w 9989820"/>
-                <a:gd name="connsiteY3" fmla="*/ 7620 h 3444240"/>
-                <a:gd name="connsiteX4" fmla="*/ 9989820 w 9989820"/>
-                <a:gd name="connsiteY4" fmla="*/ 3444240 h 3444240"/>
-                <a:gd name="connsiteX5" fmla="*/ 0 w 9989820"/>
-                <a:gd name="connsiteY5" fmla="*/ 3444240 h 3444240"/>
-                <a:gd name="connsiteX6" fmla="*/ 0 w 9989820"/>
-                <a:gd name="connsiteY6" fmla="*/ 7620 h 3444240"/>
-                <a:gd name="connsiteX0" fmla="*/ 0 w 9989820"/>
-                <a:gd name="connsiteY0" fmla="*/ 7620 h 3444240"/>
-                <a:gd name="connsiteX1" fmla="*/ 4579620 w 9989820"/>
-                <a:gd name="connsiteY1" fmla="*/ 510540 h 3444240"/>
-                <a:gd name="connsiteX2" fmla="*/ 4632960 w 9989820"/>
-                <a:gd name="connsiteY2" fmla="*/ 0 h 3444240"/>
-                <a:gd name="connsiteX3" fmla="*/ 9989820 w 9989820"/>
-                <a:gd name="connsiteY3" fmla="*/ 7620 h 3444240"/>
-                <a:gd name="connsiteX4" fmla="*/ 9989820 w 9989820"/>
-                <a:gd name="connsiteY4" fmla="*/ 3444240 h 3444240"/>
-                <a:gd name="connsiteX5" fmla="*/ 0 w 9989820"/>
-                <a:gd name="connsiteY5" fmla="*/ 3444240 h 3444240"/>
-                <a:gd name="connsiteX6" fmla="*/ 0 w 9989820"/>
-                <a:gd name="connsiteY6" fmla="*/ 7620 h 3444240"/>
-                <a:gd name="connsiteX0" fmla="*/ 15240 w 9989820"/>
-                <a:gd name="connsiteY0" fmla="*/ 472440 h 3444240"/>
-                <a:gd name="connsiteX1" fmla="*/ 4579620 w 9989820"/>
-                <a:gd name="connsiteY1" fmla="*/ 510540 h 3444240"/>
-                <a:gd name="connsiteX2" fmla="*/ 4632960 w 9989820"/>
-                <a:gd name="connsiteY2" fmla="*/ 0 h 3444240"/>
-                <a:gd name="connsiteX3" fmla="*/ 9989820 w 9989820"/>
-                <a:gd name="connsiteY3" fmla="*/ 7620 h 3444240"/>
-                <a:gd name="connsiteX4" fmla="*/ 9989820 w 9989820"/>
-                <a:gd name="connsiteY4" fmla="*/ 3444240 h 3444240"/>
-                <a:gd name="connsiteX5" fmla="*/ 0 w 9989820"/>
-                <a:gd name="connsiteY5" fmla="*/ 3444240 h 3444240"/>
-                <a:gd name="connsiteX6" fmla="*/ 15240 w 9989820"/>
-                <a:gd name="connsiteY6" fmla="*/ 472440 h 3444240"/>
-                <a:gd name="connsiteX0" fmla="*/ 15240 w 9989820"/>
-                <a:gd name="connsiteY0" fmla="*/ 472440 h 3444240"/>
-                <a:gd name="connsiteX1" fmla="*/ 4579620 w 9989820"/>
-                <a:gd name="connsiteY1" fmla="*/ 510540 h 3444240"/>
-                <a:gd name="connsiteX2" fmla="*/ 4579620 w 9989820"/>
-                <a:gd name="connsiteY2" fmla="*/ 0 h 3444240"/>
-                <a:gd name="connsiteX3" fmla="*/ 9989820 w 9989820"/>
-                <a:gd name="connsiteY3" fmla="*/ 7620 h 3444240"/>
-                <a:gd name="connsiteX4" fmla="*/ 9989820 w 9989820"/>
-                <a:gd name="connsiteY4" fmla="*/ 3444240 h 3444240"/>
-                <a:gd name="connsiteX5" fmla="*/ 0 w 9989820"/>
-                <a:gd name="connsiteY5" fmla="*/ 3444240 h 3444240"/>
-                <a:gd name="connsiteX6" fmla="*/ 15240 w 9989820"/>
-                <a:gd name="connsiteY6" fmla="*/ 472440 h 3444240"/>
-                <a:gd name="connsiteX0" fmla="*/ 15240 w 9989820"/>
-                <a:gd name="connsiteY0" fmla="*/ 563880 h 3444240"/>
-                <a:gd name="connsiteX1" fmla="*/ 4579620 w 9989820"/>
-                <a:gd name="connsiteY1" fmla="*/ 510540 h 3444240"/>
-                <a:gd name="connsiteX2" fmla="*/ 4579620 w 9989820"/>
-                <a:gd name="connsiteY2" fmla="*/ 0 h 3444240"/>
-                <a:gd name="connsiteX3" fmla="*/ 9989820 w 9989820"/>
-                <a:gd name="connsiteY3" fmla="*/ 7620 h 3444240"/>
-                <a:gd name="connsiteX4" fmla="*/ 9989820 w 9989820"/>
-                <a:gd name="connsiteY4" fmla="*/ 3444240 h 3444240"/>
-                <a:gd name="connsiteX5" fmla="*/ 0 w 9989820"/>
-                <a:gd name="connsiteY5" fmla="*/ 3444240 h 3444240"/>
-                <a:gd name="connsiteX6" fmla="*/ 15240 w 9989820"/>
-                <a:gd name="connsiteY6" fmla="*/ 563880 h 3444240"/>
-                <a:gd name="connsiteX0" fmla="*/ 15240 w 9989820"/>
-                <a:gd name="connsiteY0" fmla="*/ 563880 h 3444240"/>
-                <a:gd name="connsiteX1" fmla="*/ 4589145 w 9989820"/>
-                <a:gd name="connsiteY1" fmla="*/ 543878 h 3444240"/>
-                <a:gd name="connsiteX2" fmla="*/ 4579620 w 9989820"/>
-                <a:gd name="connsiteY2" fmla="*/ 0 h 3444240"/>
-                <a:gd name="connsiteX3" fmla="*/ 9989820 w 9989820"/>
-                <a:gd name="connsiteY3" fmla="*/ 7620 h 3444240"/>
-                <a:gd name="connsiteX4" fmla="*/ 9989820 w 9989820"/>
-                <a:gd name="connsiteY4" fmla="*/ 3444240 h 3444240"/>
-                <a:gd name="connsiteX5" fmla="*/ 0 w 9989820"/>
-                <a:gd name="connsiteY5" fmla="*/ 3444240 h 3444240"/>
-                <a:gd name="connsiteX6" fmla="*/ 15240 w 9989820"/>
-                <a:gd name="connsiteY6" fmla="*/ 563880 h 3444240"/>
-                <a:gd name="connsiteX0" fmla="*/ 0 w 10007917"/>
-                <a:gd name="connsiteY0" fmla="*/ 521018 h 3444240"/>
-                <a:gd name="connsiteX1" fmla="*/ 4607242 w 10007917"/>
-                <a:gd name="connsiteY1" fmla="*/ 543878 h 3444240"/>
-                <a:gd name="connsiteX2" fmla="*/ 4597717 w 10007917"/>
-                <a:gd name="connsiteY2" fmla="*/ 0 h 3444240"/>
-                <a:gd name="connsiteX3" fmla="*/ 10007917 w 10007917"/>
-                <a:gd name="connsiteY3" fmla="*/ 7620 h 3444240"/>
-                <a:gd name="connsiteX4" fmla="*/ 10007917 w 10007917"/>
-                <a:gd name="connsiteY4" fmla="*/ 3444240 h 3444240"/>
-                <a:gd name="connsiteX5" fmla="*/ 18097 w 10007917"/>
-                <a:gd name="connsiteY5" fmla="*/ 3444240 h 3444240"/>
-                <a:gd name="connsiteX6" fmla="*/ 0 w 10007917"/>
-                <a:gd name="connsiteY6" fmla="*/ 521018 h 3444240"/>
-                <a:gd name="connsiteX0" fmla="*/ 5715 w 9989820"/>
-                <a:gd name="connsiteY0" fmla="*/ 521018 h 3444240"/>
-                <a:gd name="connsiteX1" fmla="*/ 4589145 w 9989820"/>
-                <a:gd name="connsiteY1" fmla="*/ 543878 h 3444240"/>
-                <a:gd name="connsiteX2" fmla="*/ 4579620 w 9989820"/>
-                <a:gd name="connsiteY2" fmla="*/ 0 h 3444240"/>
-                <a:gd name="connsiteX3" fmla="*/ 9989820 w 9989820"/>
-                <a:gd name="connsiteY3" fmla="*/ 7620 h 3444240"/>
-                <a:gd name="connsiteX4" fmla="*/ 9989820 w 9989820"/>
-                <a:gd name="connsiteY4" fmla="*/ 3444240 h 3444240"/>
-                <a:gd name="connsiteX5" fmla="*/ 0 w 9989820"/>
-                <a:gd name="connsiteY5" fmla="*/ 3444240 h 3444240"/>
-                <a:gd name="connsiteX6" fmla="*/ 5715 w 9989820"/>
-                <a:gd name="connsiteY6" fmla="*/ 521018 h 3444240"/>
-              </a:gdLst>
-              <a:ahLst/>
-              <a:cxnLst>
-                <a:cxn ang="0">
-                  <a:pos x="connsiteX0" y="connsiteY0"/>
-                </a:cxn>
-                <a:cxn ang="0">
-                  <a:pos x="connsiteX1" y="connsiteY1"/>
-                </a:cxn>
-                <a:cxn ang="0">
-                  <a:pos x="connsiteX2" y="connsiteY2"/>
-                </a:cxn>
-                <a:cxn ang="0">
-                  <a:pos x="connsiteX3" y="connsiteY3"/>
-                </a:cxn>
-                <a:cxn ang="0">
-                  <a:pos x="connsiteX4" y="connsiteY4"/>
-                </a:cxn>
-                <a:cxn ang="0">
-                  <a:pos x="connsiteX5" y="connsiteY5"/>
-                </a:cxn>
-                <a:cxn ang="0">
-                  <a:pos x="connsiteX6" y="connsiteY6"/>
-                </a:cxn>
-              </a:cxnLst>
-              <a:rect l="l" t="t" r="r" b="b"/>
-              <a:pathLst>
-                <a:path w="9989820" h="3444240">
-                  <a:moveTo>
-                    <a:pt x="5715" y="521018"/>
-                  </a:moveTo>
-                  <a:lnTo>
-                    <a:pt x="4589145" y="543878"/>
-                  </a:lnTo>
-                  <a:lnTo>
-                    <a:pt x="4579620" y="0"/>
-                  </a:lnTo>
-                  <a:lnTo>
-                    <a:pt x="9989820" y="7620"/>
-                  </a:lnTo>
-                  <a:lnTo>
-                    <a:pt x="9989820" y="3444240"/>
-                  </a:lnTo>
-                  <a:lnTo>
-                    <a:pt x="0" y="3444240"/>
-                  </a:lnTo>
-                  <a:lnTo>
-                    <a:pt x="5715" y="521018"/>
-                  </a:lnTo>
-                  <a:close/>
-                </a:path>
-              </a:pathLst>
-            </a:custGeom>
-            <a:noFill/>
-            <a:ln w="19050">
-              <a:solidFill>
-                <a:srgbClr val="FFC000"/>
-              </a:solidFill>
-            </a:ln>
-          </p:spPr>
-          <p:style>
-            <a:lnRef idx="2">
-              <a:schemeClr val="accent1">
-                <a:shade val="50000"/>
-              </a:schemeClr>
-            </a:lnRef>
-            <a:fillRef idx="1">
-              <a:schemeClr val="accent1"/>
-            </a:fillRef>
-            <a:effectRef idx="0">
-              <a:schemeClr val="accent1"/>
-            </a:effectRef>
-            <a:fontRef idx="minor">
-              <a:schemeClr val="lt1"/>
-            </a:fontRef>
-          </p:style>
-          <p:txBody>
-            <a:bodyPr rtlCol="0" anchor="ctr"/>
-            <a:lstStyle/>
-            <a:p>
-              <a:pPr algn="ctr"/>
-              <a:endParaRPr lang="en-IL" dirty="0"/>
-            </a:p>
-          </p:txBody>
-        </p:sp>
-        <p:sp>
-          <p:nvSpPr>
-            <p:cNvPr id="8" name="Rectangle 7">
-              <a:extLst>
-                <a:ext uri="{FF2B5EF4-FFF2-40B4-BE49-F238E27FC236}">
-                  <a16:creationId xmlns:a16="http://schemas.microsoft.com/office/drawing/2014/main" id="{24387B52-F2F4-4788-81B4-2A40FF191C45}"/>
-                </a:ext>
-              </a:extLst>
-            </p:cNvPr>
-            <p:cNvSpPr/>
-            <p:nvPr/>
-          </p:nvSpPr>
-          <p:spPr>
-            <a:xfrm>
-              <a:off x="1455420" y="312420"/>
-              <a:ext cx="2392680" cy="3337530"/>
+              <a:off x="4345726" y="350467"/>
+              <a:ext cx="1616366" cy="141505"/>
             </a:xfrm>
             <a:prstGeom prst="rect">
               <a:avLst/>
             </a:prstGeom>
-            <a:noFill/>
-            <a:ln w="19050">
-              <a:solidFill>
-                <a:srgbClr val="FFC000"/>
-              </a:solidFill>
-            </a:ln>
           </p:spPr>
-          <p:style>
-            <a:lnRef idx="2">
-              <a:schemeClr val="accent1">
-                <a:shade val="50000"/>
-              </a:schemeClr>
-            </a:lnRef>
-            <a:fillRef idx="1">
-              <a:schemeClr val="accent1"/>
-            </a:fillRef>
-            <a:effectRef idx="0">
-              <a:schemeClr val="accent1"/>
-            </a:effectRef>
-            <a:fontRef idx="minor">
-              <a:schemeClr val="lt1"/>
-            </a:fontRef>
-          </p:style>
-          <p:txBody>
-            <a:bodyPr rtlCol="0" anchor="ctr"/>
-            <a:lstStyle/>
-            <a:p>
-              <a:pPr algn="ctr"/>
-              <a:endParaRPr lang="en-IL"/>
-            </a:p>
-          </p:txBody>
-        </p:sp>
-        <p:sp>
-          <p:nvSpPr>
-            <p:cNvPr id="9" name="Rectangle 8">
-              <a:extLst>
-                <a:ext uri="{FF2B5EF4-FFF2-40B4-BE49-F238E27FC236}">
-                  <a16:creationId xmlns:a16="http://schemas.microsoft.com/office/drawing/2014/main" id="{0257EB90-92C4-464F-A8B1-63DD03465A8F}"/>
-                </a:ext>
-              </a:extLst>
-            </p:cNvPr>
-            <p:cNvSpPr/>
-            <p:nvPr/>
-          </p:nvSpPr>
-          <p:spPr>
-            <a:xfrm>
-              <a:off x="4229100" y="289560"/>
-              <a:ext cx="3139440" cy="3360390"/>
-            </a:xfrm>
-            <a:custGeom>
-              <a:avLst/>
-              <a:gdLst>
-                <a:gd name="connsiteX0" fmla="*/ 0 w 1714500"/>
-                <a:gd name="connsiteY0" fmla="*/ 0 h 3337530"/>
-                <a:gd name="connsiteX1" fmla="*/ 1714500 w 1714500"/>
-                <a:gd name="connsiteY1" fmla="*/ 0 h 3337530"/>
-                <a:gd name="connsiteX2" fmla="*/ 1714500 w 1714500"/>
-                <a:gd name="connsiteY2" fmla="*/ 3337530 h 3337530"/>
-                <a:gd name="connsiteX3" fmla="*/ 0 w 1714500"/>
-                <a:gd name="connsiteY3" fmla="*/ 3337530 h 3337530"/>
-                <a:gd name="connsiteX4" fmla="*/ 0 w 1714500"/>
-                <a:gd name="connsiteY4" fmla="*/ 0 h 3337530"/>
-                <a:gd name="connsiteX0" fmla="*/ 0 w 1714500"/>
-                <a:gd name="connsiteY0" fmla="*/ 0 h 3337530"/>
-                <a:gd name="connsiteX1" fmla="*/ 1714500 w 1714500"/>
-                <a:gd name="connsiteY1" fmla="*/ 0 h 3337530"/>
-                <a:gd name="connsiteX2" fmla="*/ 1714500 w 1714500"/>
-                <a:gd name="connsiteY2" fmla="*/ 2750820 h 3337530"/>
-                <a:gd name="connsiteX3" fmla="*/ 1714500 w 1714500"/>
-                <a:gd name="connsiteY3" fmla="*/ 3337530 h 3337530"/>
-                <a:gd name="connsiteX4" fmla="*/ 0 w 1714500"/>
-                <a:gd name="connsiteY4" fmla="*/ 3337530 h 3337530"/>
-                <a:gd name="connsiteX5" fmla="*/ 0 w 1714500"/>
-                <a:gd name="connsiteY5" fmla="*/ 0 h 3337530"/>
-                <a:gd name="connsiteX0" fmla="*/ 0 w 1714500"/>
-                <a:gd name="connsiteY0" fmla="*/ 0 h 3337530"/>
-                <a:gd name="connsiteX1" fmla="*/ 1714500 w 1714500"/>
-                <a:gd name="connsiteY1" fmla="*/ 0 h 3337530"/>
-                <a:gd name="connsiteX2" fmla="*/ 1714500 w 1714500"/>
-                <a:gd name="connsiteY2" fmla="*/ 121920 h 3337530"/>
-                <a:gd name="connsiteX3" fmla="*/ 1714500 w 1714500"/>
-                <a:gd name="connsiteY3" fmla="*/ 2750820 h 3337530"/>
-                <a:gd name="connsiteX4" fmla="*/ 1714500 w 1714500"/>
-                <a:gd name="connsiteY4" fmla="*/ 3337530 h 3337530"/>
-                <a:gd name="connsiteX5" fmla="*/ 0 w 1714500"/>
-                <a:gd name="connsiteY5" fmla="*/ 3337530 h 3337530"/>
-                <a:gd name="connsiteX6" fmla="*/ 0 w 1714500"/>
-                <a:gd name="connsiteY6" fmla="*/ 0 h 3337530"/>
-                <a:gd name="connsiteX0" fmla="*/ 0 w 3139440"/>
-                <a:gd name="connsiteY0" fmla="*/ 0 h 3337530"/>
-                <a:gd name="connsiteX1" fmla="*/ 1714500 w 3139440"/>
-                <a:gd name="connsiteY1" fmla="*/ 0 h 3337530"/>
-                <a:gd name="connsiteX2" fmla="*/ 3139440 w 3139440"/>
-                <a:gd name="connsiteY2" fmla="*/ 2758440 h 3337530"/>
-                <a:gd name="connsiteX3" fmla="*/ 1714500 w 3139440"/>
-                <a:gd name="connsiteY3" fmla="*/ 2750820 h 3337530"/>
-                <a:gd name="connsiteX4" fmla="*/ 1714500 w 3139440"/>
-                <a:gd name="connsiteY4" fmla="*/ 3337530 h 3337530"/>
-                <a:gd name="connsiteX5" fmla="*/ 0 w 3139440"/>
-                <a:gd name="connsiteY5" fmla="*/ 3337530 h 3337530"/>
-                <a:gd name="connsiteX6" fmla="*/ 0 w 3139440"/>
-                <a:gd name="connsiteY6" fmla="*/ 0 h 3337530"/>
-                <a:gd name="connsiteX0" fmla="*/ 0 w 3139440"/>
-                <a:gd name="connsiteY0" fmla="*/ 22860 h 3360390"/>
-                <a:gd name="connsiteX1" fmla="*/ 3131820 w 3139440"/>
-                <a:gd name="connsiteY1" fmla="*/ 0 h 3360390"/>
-                <a:gd name="connsiteX2" fmla="*/ 3139440 w 3139440"/>
-                <a:gd name="connsiteY2" fmla="*/ 2781300 h 3360390"/>
-                <a:gd name="connsiteX3" fmla="*/ 1714500 w 3139440"/>
-                <a:gd name="connsiteY3" fmla="*/ 2773680 h 3360390"/>
-                <a:gd name="connsiteX4" fmla="*/ 1714500 w 3139440"/>
-                <a:gd name="connsiteY4" fmla="*/ 3360390 h 3360390"/>
-                <a:gd name="connsiteX5" fmla="*/ 0 w 3139440"/>
-                <a:gd name="connsiteY5" fmla="*/ 3360390 h 3360390"/>
-                <a:gd name="connsiteX6" fmla="*/ 0 w 3139440"/>
-                <a:gd name="connsiteY6" fmla="*/ 22860 h 3360390"/>
-              </a:gdLst>
-              <a:ahLst/>
-              <a:cxnLst>
-                <a:cxn ang="0">
-                  <a:pos x="connsiteX0" y="connsiteY0"/>
-                </a:cxn>
-                <a:cxn ang="0">
-                  <a:pos x="connsiteX1" y="connsiteY1"/>
-                </a:cxn>
-                <a:cxn ang="0">
-                  <a:pos x="connsiteX2" y="connsiteY2"/>
-                </a:cxn>
-                <a:cxn ang="0">
-                  <a:pos x="connsiteX3" y="connsiteY3"/>
-                </a:cxn>
-                <a:cxn ang="0">
-                  <a:pos x="connsiteX4" y="connsiteY4"/>
-                </a:cxn>
-                <a:cxn ang="0">
-                  <a:pos x="connsiteX5" y="connsiteY5"/>
-                </a:cxn>
-                <a:cxn ang="0">
-                  <a:pos x="connsiteX6" y="connsiteY6"/>
-                </a:cxn>
-              </a:cxnLst>
-              <a:rect l="l" t="t" r="r" b="b"/>
-              <a:pathLst>
-                <a:path w="3139440" h="3360390">
-                  <a:moveTo>
-                    <a:pt x="0" y="22860"/>
-                  </a:moveTo>
-                  <a:lnTo>
-                    <a:pt x="3131820" y="0"/>
-                  </a:lnTo>
-                  <a:lnTo>
-                    <a:pt x="3139440" y="2781300"/>
-                  </a:lnTo>
-                  <a:lnTo>
-                    <a:pt x="1714500" y="2773680"/>
-                  </a:lnTo>
-                  <a:lnTo>
-                    <a:pt x="1714500" y="3360390"/>
-                  </a:lnTo>
-                  <a:lnTo>
-                    <a:pt x="0" y="3360390"/>
-                  </a:lnTo>
-                  <a:lnTo>
-                    <a:pt x="0" y="22860"/>
-                  </a:lnTo>
-                  <a:close/>
-                </a:path>
-              </a:pathLst>
-            </a:custGeom>
-            <a:noFill/>
-            <a:ln w="19050">
-              <a:solidFill>
-                <a:srgbClr val="FFC000"/>
-              </a:solidFill>
-            </a:ln>
-          </p:spPr>
-          <p:style>
-            <a:lnRef idx="2">
-              <a:schemeClr val="accent1">
-                <a:shade val="50000"/>
-              </a:schemeClr>
-            </a:lnRef>
-            <a:fillRef idx="1">
-              <a:schemeClr val="accent1"/>
-            </a:fillRef>
-            <a:effectRef idx="0">
-              <a:schemeClr val="accent1"/>
-            </a:effectRef>
-            <a:fontRef idx="minor">
-              <a:schemeClr val="lt1"/>
-            </a:fontRef>
-          </p:style>
-          <p:txBody>
-            <a:bodyPr rtlCol="0" anchor="ctr"/>
-            <a:lstStyle/>
-            <a:p>
-              <a:pPr algn="ctr"/>
-              <a:endParaRPr lang="en-IL"/>
-            </a:p>
-          </p:txBody>
-        </p:sp>
-        <p:sp>
-          <p:nvSpPr>
-            <p:cNvPr id="10" name="Rectangle 9">
-              <a:extLst>
-                <a:ext uri="{FF2B5EF4-FFF2-40B4-BE49-F238E27FC236}">
-                  <a16:creationId xmlns:a16="http://schemas.microsoft.com/office/drawing/2014/main" id="{E5A5EA5C-7045-43A7-855D-BF7CD19C3E6B}"/>
-                </a:ext>
-              </a:extLst>
-            </p:cNvPr>
-            <p:cNvSpPr/>
-            <p:nvPr/>
-          </p:nvSpPr>
-          <p:spPr>
-            <a:xfrm>
-              <a:off x="2409356" y="3846651"/>
-              <a:ext cx="957250" cy="523220"/>
-            </a:xfrm>
-            <a:prstGeom prst="rect">
-              <a:avLst/>
-            </a:prstGeom>
-            <a:noFill/>
-          </p:spPr>
-          <p:txBody>
-            <a:bodyPr wrap="none" lIns="91440" tIns="45720" rIns="91440" bIns="45720">
-              <a:spAutoFit/>
-            </a:bodyPr>
-            <a:lstStyle/>
-            <a:p>
-              <a:pPr algn="ctr"/>
-              <a:r>
-                <a:rPr lang="en-US" sz="2800" b="0" cap="none" spc="0" dirty="0">
-                  <a:ln w="0"/>
-                  <a:solidFill>
-                    <a:srgbClr val="FFC000"/>
-                  </a:solidFill>
-                  <a:effectLst>
-                    <a:outerShdw blurRad="38100" dist="25400" dir="5400000" algn="ctr" rotWithShape="0">
-                      <a:srgbClr val="6E747A">
-                        <a:alpha val="43000"/>
-                      </a:srgbClr>
-                    </a:outerShdw>
-                  </a:effectLst>
-                </a:rPr>
-                <a:t>View</a:t>
-              </a:r>
-            </a:p>
-          </p:txBody>
-        </p:sp>
-        <p:sp>
-          <p:nvSpPr>
-            <p:cNvPr id="11" name="Rectangle 10">
-              <a:extLst>
-                <a:ext uri="{FF2B5EF4-FFF2-40B4-BE49-F238E27FC236}">
-                  <a16:creationId xmlns:a16="http://schemas.microsoft.com/office/drawing/2014/main" id="{D230C6C9-2DB2-4572-A5EF-1EEF40DE3341}"/>
-                </a:ext>
-              </a:extLst>
-            </p:cNvPr>
-            <p:cNvSpPr/>
-            <p:nvPr/>
-          </p:nvSpPr>
-          <p:spPr>
-            <a:xfrm>
-              <a:off x="1703623" y="627370"/>
-              <a:ext cx="1938287" cy="523220"/>
-            </a:xfrm>
-            <a:prstGeom prst="rect">
-              <a:avLst/>
-            </a:prstGeom>
-            <a:noFill/>
-          </p:spPr>
-          <p:txBody>
-            <a:bodyPr wrap="none" lIns="91440" tIns="45720" rIns="91440" bIns="45720">
-              <a:spAutoFit/>
-            </a:bodyPr>
-            <a:lstStyle/>
-            <a:p>
-              <a:pPr algn="ctr"/>
-              <a:r>
-                <a:rPr lang="en-US" sz="2800" b="0" cap="none" spc="0" dirty="0">
-                  <a:ln w="0"/>
-                  <a:solidFill>
-                    <a:srgbClr val="FFC000"/>
-                  </a:solidFill>
-                  <a:effectLst>
-                    <a:outerShdw blurRad="38100" dist="25400" dir="5400000" algn="ctr" rotWithShape="0">
-                      <a:srgbClr val="6E747A">
-                        <a:alpha val="43000"/>
-                      </a:srgbClr>
-                    </a:outerShdw>
-                  </a:effectLst>
-                </a:rPr>
-                <a:t>ViewModel</a:t>
-              </a:r>
-            </a:p>
-          </p:txBody>
-        </p:sp>
-        <p:sp>
-          <p:nvSpPr>
-            <p:cNvPr id="12" name="Rectangle 11">
-              <a:extLst>
-                <a:ext uri="{FF2B5EF4-FFF2-40B4-BE49-F238E27FC236}">
-                  <a16:creationId xmlns:a16="http://schemas.microsoft.com/office/drawing/2014/main" id="{912E8A78-8249-40E5-B825-B321BA8D05DF}"/>
-                </a:ext>
-              </a:extLst>
-            </p:cNvPr>
-            <p:cNvSpPr/>
-            <p:nvPr/>
-          </p:nvSpPr>
-          <p:spPr>
-            <a:xfrm>
-              <a:off x="6038928" y="365760"/>
-              <a:ext cx="1165704" cy="523220"/>
-            </a:xfrm>
-            <a:prstGeom prst="rect">
-              <a:avLst/>
-            </a:prstGeom>
-            <a:noFill/>
-          </p:spPr>
-          <p:txBody>
-            <a:bodyPr wrap="none" lIns="91440" tIns="45720" rIns="91440" bIns="45720">
-              <a:spAutoFit/>
-            </a:bodyPr>
-            <a:lstStyle/>
-            <a:p>
-              <a:pPr algn="ctr"/>
-              <a:r>
-                <a:rPr lang="en-US" sz="2800" b="0" cap="none" spc="0" dirty="0">
-                  <a:ln w="0"/>
-                  <a:solidFill>
-                    <a:srgbClr val="FFC000"/>
-                  </a:solidFill>
-                  <a:effectLst>
-                    <a:outerShdw blurRad="38100" dist="25400" dir="5400000" algn="ctr" rotWithShape="0">
-                      <a:srgbClr val="6E747A">
-                        <a:alpha val="43000"/>
-                      </a:srgbClr>
-                    </a:outerShdw>
-                  </a:effectLst>
-                </a:rPr>
-                <a:t>Model</a:t>
-              </a:r>
-            </a:p>
-          </p:txBody>
-        </p:sp>
+        </p:pic>
       </p:grpSp>
     </p:spTree>
     <p:extLst>
       <p:ext uri="{BB962C8B-B14F-4D97-AF65-F5344CB8AC3E}">
-        <p14:creationId xmlns:p14="http://schemas.microsoft.com/office/powerpoint/2010/main" val="1224810735"/>
+        <p14:creationId xmlns:p14="http://schemas.microsoft.com/office/powerpoint/2010/main" val="334639604"/>
       </p:ext>
     </p:extLst>
   </p:cSld>

</xml_diff>